<commit_message>
update to Ted presentation
</commit_message>
<xml_diff>
--- a/Presentation/TED².pptx
+++ b/Presentation/TED².pptx
@@ -14,9 +14,7 @@
     <p:sldId id="259" r:id="rId8"/>
     <p:sldId id="258" r:id="rId9"/>
     <p:sldId id="265" r:id="rId10"/>
-    <p:sldId id="266" r:id="rId11"/>
-    <p:sldId id="267" r:id="rId12"/>
-    <p:sldId id="260" r:id="rId13"/>
+    <p:sldId id="260" r:id="rId11"/>
   </p:sldIdLst>
   <p:sldSz cx="12192000" cy="6858000"/>
   <p:notesSz cx="6858000" cy="9144000"/>
@@ -1533,7 +1531,7 @@
             <a:fld id="{48A87A34-81AB-432B-8DAE-1953F412C126}" type="datetimeFigureOut">
               <a:rPr lang="en-US" dirty="0"/>
               <a:pPr/>
-              <a:t>9/29/17</a:t>
+              <a:t>10/5/17</a:t>
             </a:fld>
             <a:endParaRPr lang="en-US" dirty="0"/>
           </a:p>
@@ -2987,7 +2985,7 @@
           <a:p>
             <a:fld id="{48A87A34-81AB-432B-8DAE-1953F412C126}" type="datetimeFigureOut">
               <a:rPr lang="en-US" dirty="0"/>
-              <a:t>9/29/17</a:t>
+              <a:t>10/5/17</a:t>
             </a:fld>
             <a:endParaRPr lang="en-US" dirty="0"/>
           </a:p>
@@ -4435,7 +4433,7 @@
           <a:p>
             <a:fld id="{48A87A34-81AB-432B-8DAE-1953F412C126}" type="datetimeFigureOut">
               <a:rPr lang="en-US" dirty="0"/>
-              <a:t>9/29/17</a:t>
+              <a:t>10/5/17</a:t>
             </a:fld>
             <a:endParaRPr lang="en-US" dirty="0"/>
           </a:p>
@@ -5885,7 +5883,7 @@
           <a:p>
             <a:fld id="{48A87A34-81AB-432B-8DAE-1953F412C126}" type="datetimeFigureOut">
               <a:rPr lang="en-US" dirty="0"/>
-              <a:t>9/29/17</a:t>
+              <a:t>10/5/17</a:t>
             </a:fld>
             <a:endParaRPr lang="en-US" dirty="0"/>
           </a:p>
@@ -7388,7 +7386,7 @@
           <a:p>
             <a:fld id="{48A87A34-81AB-432B-8DAE-1953F412C126}" type="datetimeFigureOut">
               <a:rPr lang="en-US" dirty="0"/>
-              <a:t>9/29/17</a:t>
+              <a:t>10/5/17</a:t>
             </a:fld>
             <a:endParaRPr lang="en-US" dirty="0"/>
           </a:p>
@@ -8904,7 +8902,7 @@
           <a:p>
             <a:fld id="{48A87A34-81AB-432B-8DAE-1953F412C126}" type="datetimeFigureOut">
               <a:rPr lang="en-US" dirty="0"/>
-              <a:t>9/29/17</a:t>
+              <a:t>10/5/17</a:t>
             </a:fld>
             <a:endParaRPr lang="en-US" dirty="0"/>
           </a:p>
@@ -10564,7 +10562,7 @@
           <a:p>
             <a:fld id="{48A87A34-81AB-432B-8DAE-1953F412C126}" type="datetimeFigureOut">
               <a:rPr lang="en-US" dirty="0"/>
-              <a:t>9/29/17</a:t>
+              <a:t>10/5/17</a:t>
             </a:fld>
             <a:endParaRPr lang="en-US" dirty="0"/>
           </a:p>
@@ -11957,7 +11955,7 @@
           <a:p>
             <a:fld id="{48A87A34-81AB-432B-8DAE-1953F412C126}" type="datetimeFigureOut">
               <a:rPr lang="en-US" dirty="0"/>
-              <a:t>9/29/17</a:t>
+              <a:t>10/5/17</a:t>
             </a:fld>
             <a:endParaRPr lang="en-US" dirty="0"/>
           </a:p>
@@ -12052,7 +12050,7 @@
           <a:p>
             <a:fld id="{48A87A34-81AB-432B-8DAE-1953F412C126}" type="datetimeFigureOut">
               <a:rPr lang="en-US" dirty="0"/>
-              <a:t>9/29/17</a:t>
+              <a:t>10/5/17</a:t>
             </a:fld>
             <a:endParaRPr lang="en-US" dirty="0"/>
           </a:p>
@@ -13573,7 +13571,7 @@
           <a:p>
             <a:fld id="{48A87A34-81AB-432B-8DAE-1953F412C126}" type="datetimeFigureOut">
               <a:rPr lang="en-US" dirty="0"/>
-              <a:t>9/29/17</a:t>
+              <a:t>10/5/17</a:t>
             </a:fld>
             <a:endParaRPr lang="en-US" dirty="0"/>
           </a:p>
@@ -15104,7 +15102,7 @@
           <a:p>
             <a:fld id="{48A87A34-81AB-432B-8DAE-1953F412C126}" type="datetimeFigureOut">
               <a:rPr lang="en-US" dirty="0"/>
-              <a:t>9/29/17</a:t>
+              <a:t>10/5/17</a:t>
             </a:fld>
             <a:endParaRPr lang="en-US" dirty="0"/>
           </a:p>
@@ -15350,7 +15348,7 @@
             <a:fld id="{48A87A34-81AB-432B-8DAE-1953F412C126}" type="datetimeFigureOut">
               <a:rPr lang="en-US" dirty="0"/>
               <a:pPr/>
-              <a:t>9/29/17</a:t>
+              <a:t>10/5/17</a:t>
             </a:fld>
             <a:endParaRPr lang="en-US" dirty="0"/>
           </a:p>
@@ -15900,162 +15898,6 @@
           <a:p>
             <a:r>
               <a:rPr lang="en-US" dirty="0"/>
-              <a:t>Marketing Plan</a:t>
-            </a:r>
-          </a:p>
-        </p:txBody>
-      </p:sp>
-      <p:sp>
-        <p:nvSpPr>
-          <p:cNvPr id="3" name="Content Placeholder 2"/>
-          <p:cNvSpPr>
-            <a:spLocks noGrp="1"/>
-          </p:cNvSpPr>
-          <p:nvPr>
-            <p:ph idx="1"/>
-          </p:nvPr>
-        </p:nvSpPr>
-        <p:spPr/>
-        <p:txBody>
-          <a:bodyPr/>
-          <a:lstStyle/>
-          <a:p>
-            <a:endParaRPr lang="en-US"/>
-          </a:p>
-        </p:txBody>
-      </p:sp>
-    </p:spTree>
-    <p:extLst>
-      <p:ext uri="{BB962C8B-B14F-4D97-AF65-F5344CB8AC3E}">
-        <p14:creationId xmlns:p14="http://schemas.microsoft.com/office/powerpoint/2010/main" val="34641947"/>
-      </p:ext>
-    </p:extLst>
-  </p:cSld>
-  <p:clrMapOvr>
-    <a:masterClrMapping/>
-  </p:clrMapOvr>
-  <p:timing>
-    <p:tnLst>
-      <p:par>
-        <p:cTn id="1" dur="indefinite" restart="never" nodeType="tmRoot"/>
-      </p:par>
-    </p:tnLst>
-  </p:timing>
-</p:sld>
-</file>
-
-<file path=ppt/slides/slide11.xml><?xml version="1.0" encoding="utf-8"?>
-<p:sld xmlns:a="http://schemas.openxmlformats.org/drawingml/2006/main" xmlns:r="http://schemas.openxmlformats.org/officeDocument/2006/relationships" xmlns:p="http://schemas.openxmlformats.org/presentationml/2006/main">
-  <p:cSld>
-    <p:spTree>
-      <p:nvGrpSpPr>
-        <p:cNvPr id="1" name=""/>
-        <p:cNvGrpSpPr/>
-        <p:nvPr/>
-      </p:nvGrpSpPr>
-      <p:grpSpPr>
-        <a:xfrm>
-          <a:off x="0" y="0"/>
-          <a:ext cx="0" cy="0"/>
-          <a:chOff x="0" y="0"/>
-          <a:chExt cx="0" cy="0"/>
-        </a:xfrm>
-      </p:grpSpPr>
-      <p:sp>
-        <p:nvSpPr>
-          <p:cNvPr id="2" name="Title 1"/>
-          <p:cNvSpPr>
-            <a:spLocks noGrp="1"/>
-          </p:cNvSpPr>
-          <p:nvPr>
-            <p:ph type="title"/>
-          </p:nvPr>
-        </p:nvSpPr>
-        <p:spPr/>
-        <p:txBody>
-          <a:bodyPr/>
-          <a:lstStyle/>
-          <a:p>
-            <a:r>
-              <a:rPr lang="en-US" dirty="0"/>
-              <a:t>Cost</a:t>
-            </a:r>
-          </a:p>
-        </p:txBody>
-      </p:sp>
-      <p:sp>
-        <p:nvSpPr>
-          <p:cNvPr id="3" name="Content Placeholder 2"/>
-          <p:cNvSpPr>
-            <a:spLocks noGrp="1"/>
-          </p:cNvSpPr>
-          <p:nvPr>
-            <p:ph idx="1"/>
-          </p:nvPr>
-        </p:nvSpPr>
-        <p:spPr/>
-        <p:txBody>
-          <a:bodyPr/>
-          <a:lstStyle/>
-          <a:p>
-            <a:endParaRPr lang="en-US"/>
-          </a:p>
-        </p:txBody>
-      </p:sp>
-    </p:spTree>
-    <p:extLst>
-      <p:ext uri="{BB962C8B-B14F-4D97-AF65-F5344CB8AC3E}">
-        <p14:creationId xmlns:p14="http://schemas.microsoft.com/office/powerpoint/2010/main" val="259134892"/>
-      </p:ext>
-    </p:extLst>
-  </p:cSld>
-  <p:clrMapOvr>
-    <a:masterClrMapping/>
-  </p:clrMapOvr>
-  <p:timing>
-    <p:tnLst>
-      <p:par>
-        <p:cTn id="1" dur="indefinite" restart="never" nodeType="tmRoot"/>
-      </p:par>
-    </p:tnLst>
-  </p:timing>
-</p:sld>
-</file>
-
-<file path=ppt/slides/slide12.xml><?xml version="1.0" encoding="utf-8"?>
-<p:sld xmlns:a="http://schemas.openxmlformats.org/drawingml/2006/main" xmlns:r="http://schemas.openxmlformats.org/officeDocument/2006/relationships" xmlns:p="http://schemas.openxmlformats.org/presentationml/2006/main">
-  <p:cSld>
-    <p:spTree>
-      <p:nvGrpSpPr>
-        <p:cNvPr id="1" name=""/>
-        <p:cNvGrpSpPr/>
-        <p:nvPr/>
-      </p:nvGrpSpPr>
-      <p:grpSpPr>
-        <a:xfrm>
-          <a:off x="0" y="0"/>
-          <a:ext cx="0" cy="0"/>
-          <a:chOff x="0" y="0"/>
-          <a:chExt cx="0" cy="0"/>
-        </a:xfrm>
-      </p:grpSpPr>
-      <p:sp>
-        <p:nvSpPr>
-          <p:cNvPr id="2" name="Title 1"/>
-          <p:cNvSpPr>
-            <a:spLocks noGrp="1"/>
-          </p:cNvSpPr>
-          <p:nvPr>
-            <p:ph type="title"/>
-          </p:nvPr>
-        </p:nvSpPr>
-        <p:spPr/>
-        <p:txBody>
-          <a:bodyPr/>
-          <a:lstStyle/>
-          <a:p>
-            <a:r>
-              <a:rPr lang="en-US" dirty="0"/>
               <a:t>Group Milestones</a:t>
             </a:r>
           </a:p>
@@ -16076,6 +15918,46 @@
           <a:bodyPr/>
           <a:lstStyle/>
           <a:p>
+            <a:r>
+              <a:rPr lang="en-US" dirty="0"/>
+              <a:t>Database formation and </a:t>
+            </a:r>
+            <a:r>
+              <a:rPr lang="en-US" dirty="0" smtClean="0"/>
+              <a:t>manipulation.</a:t>
+            </a:r>
+            <a:endParaRPr lang="en-US" dirty="0"/>
+          </a:p>
+          <a:p>
+            <a:r>
+              <a:rPr lang="en-US" dirty="0"/>
+              <a:t>Connecting the API to front </a:t>
+            </a:r>
+            <a:r>
+              <a:rPr lang="en-US" dirty="0" smtClean="0"/>
+              <a:t>end.</a:t>
+            </a:r>
+            <a:endParaRPr lang="en-US" dirty="0"/>
+          </a:p>
+          <a:p>
+            <a:r>
+              <a:rPr lang="en-US" dirty="0"/>
+              <a:t>Merging into </a:t>
+            </a:r>
+            <a:r>
+              <a:rPr lang="en-US" dirty="0" err="1" smtClean="0"/>
+              <a:t>Github</a:t>
+            </a:r>
+            <a:r>
+              <a:rPr lang="en-US" dirty="0" smtClean="0"/>
+              <a:t>.</a:t>
+            </a:r>
+          </a:p>
+          <a:p>
+            <a:r>
+              <a:rPr lang="en-US" dirty="0" smtClean="0"/>
+              <a:t>Register and Login user with saved data.</a:t>
+            </a:r>
             <a:endParaRPr lang="en-US" dirty="0"/>
           </a:p>
         </p:txBody>
@@ -16183,15 +16065,8 @@
           <a:p>
             <a:r>
               <a:rPr lang="en-US" dirty="0" smtClean="0"/>
-              <a:t>Julie </a:t>
+              <a:t>Julie Ching</a:t>
             </a:r>
-            <a:r>
-              <a:rPr lang="en-US" dirty="0"/>
-              <a:t>Ching</a:t>
-            </a:r>
-          </a:p>
-          <a:p>
-            <a:endParaRPr lang="en-US" dirty="0"/>
           </a:p>
         </p:txBody>
       </p:sp>
@@ -16399,10 +16274,30 @@
           <a:lstStyle/>
           <a:p>
             <a:r>
+              <a:rPr lang="en-US" dirty="0"/>
+              <a:t>TED - Technology, Entertainment and Design. </a:t>
+            </a:r>
+          </a:p>
+          <a:p>
+            <a:r>
               <a:rPr lang="en-US" dirty="0" smtClean="0"/>
-              <a:t>Educational app to help provide an interface to search the TED library and provide related materials for user to reference.</a:t>
+              <a:t>TED </a:t>
             </a:r>
-            <a:endParaRPr lang="en-US" dirty="0"/>
+            <a:r>
+              <a:rPr lang="en-US" dirty="0"/>
+              <a:t>talks are a collection of brief yet intriguing conversations on a wide variety of topics. These narrations are presented by “the world’s most inspired thinkers” as TED refers to them. The TED organization strives to motivate curiosity, conversation and discovery. </a:t>
+            </a:r>
+            <a:endParaRPr lang="en-US" dirty="0" smtClean="0"/>
+          </a:p>
+          <a:p>
+            <a:r>
+              <a:rPr lang="en-US" dirty="0" smtClean="0"/>
+              <a:t>TED² </a:t>
+            </a:r>
+            <a:r>
+              <a:rPr lang="en-US" dirty="0"/>
+              <a:t>is a navigational tool to search the TED database. We provide an interface to access the TED database, by asking the user for search parameters, which will return a list of related TED talks. </a:t>
+            </a:r>
           </a:p>
         </p:txBody>
       </p:sp>
@@ -16495,6 +16390,10 @@
           <a:bodyPr/>
           <a:lstStyle/>
           <a:p>
+            <a:r>
+              <a:rPr lang="en-US" dirty="0" smtClean="0"/>
+              <a:t>A simplistic application that will allow us to view TED Talks. </a:t>
+            </a:r>
             <a:endParaRPr lang="en-US" dirty="0"/>
           </a:p>
         </p:txBody>
@@ -16678,52 +16577,39 @@
           <a:p>
             <a:r>
               <a:rPr lang="en-US" dirty="0" smtClean="0"/>
-              <a:t>MySQL</a:t>
+              <a:t>C</a:t>
             </a:r>
+            <a:r>
+              <a:rPr lang="en-US" dirty="0" smtClean="0"/>
+              <a:t>ookie</a:t>
+            </a:r>
+            <a:endParaRPr lang="en-US" dirty="0" smtClean="0"/>
           </a:p>
           <a:p>
             <a:r>
-              <a:rPr lang="en-US" dirty="0" smtClean="0"/>
-              <a:t>Express</a:t>
+              <a:rPr lang="en-US" dirty="0" err="1"/>
+              <a:t>B</a:t>
             </a:r>
-          </a:p>
-          <a:p>
             <a:r>
               <a:rPr lang="en-US" dirty="0" err="1" smtClean="0"/>
-              <a:t>Sequelize</a:t>
+              <a:t>crypt</a:t>
             </a:r>
             <a:endParaRPr lang="en-US" dirty="0" smtClean="0"/>
           </a:p>
           <a:p>
             <a:r>
               <a:rPr lang="en-US" dirty="0" smtClean="0"/>
-              <a:t>Materialize </a:t>
-            </a:r>
-            <a:r>
-              <a:rPr lang="en-US" dirty="0" smtClean="0"/>
-              <a:t>CSS</a:t>
+              <a:t>Materialize CSS</a:t>
             </a:r>
           </a:p>
           <a:p>
             <a:r>
               <a:rPr lang="en-US" dirty="0" smtClean="0"/>
-              <a:t>Wikipedia API</a:t>
-            </a:r>
-          </a:p>
-          <a:p>
-            <a:r>
-              <a:rPr lang="en-US" dirty="0" smtClean="0"/>
-              <a:t>TED Talk Data Set</a:t>
-            </a:r>
-          </a:p>
-          <a:p>
-            <a:r>
-              <a:rPr lang="en-US" dirty="0" smtClean="0"/>
-              <a:t>TED Talk </a:t>
+              <a:t>TED </a:t>
             </a:r>
             <a:r>
               <a:rPr lang="en-US" dirty="0" smtClean="0"/>
-              <a:t>API</a:t>
+              <a:t>Talk Data Set</a:t>
             </a:r>
           </a:p>
           <a:p>
@@ -16905,17 +16791,34 @@
           <a:p>
             <a:r>
               <a:rPr lang="en-US" dirty="0" smtClean="0"/>
-              <a:t>User history</a:t>
+              <a:t>User </a:t>
+            </a:r>
+            <a:r>
+              <a:rPr lang="en-US" dirty="0" smtClean="0"/>
+              <a:t>history.</a:t>
+            </a:r>
+            <a:endParaRPr lang="en-US" dirty="0" smtClean="0"/>
+          </a:p>
+          <a:p>
+            <a:r>
+              <a:rPr lang="en-US" dirty="0" smtClean="0"/>
+              <a:t>Paginations.</a:t>
             </a:r>
           </a:p>
           <a:p>
             <a:r>
               <a:rPr lang="en-US" dirty="0"/>
-              <a:t>P</a:t>
+              <a:t>T</a:t>
             </a:r>
             <a:r>
               <a:rPr lang="en-US" dirty="0" smtClean="0"/>
-              <a:t>opular videos </a:t>
+              <a:t>ranscript view.</a:t>
+            </a:r>
+          </a:p>
+          <a:p>
+            <a:r>
+              <a:rPr lang="en-US" dirty="0" smtClean="0"/>
+              <a:t>Multiple tags.</a:t>
             </a:r>
             <a:endParaRPr lang="en-US" dirty="0"/>
           </a:p>

</xml_diff>

<commit_message>
removal of info on presentation
</commit_message>
<xml_diff>
--- a/Presentation/TED².pptx
+++ b/Presentation/TED².pptx
@@ -16274,23 +16274,6 @@
           <a:lstStyle/>
           <a:p>
             <a:r>
-              <a:rPr lang="en-US" dirty="0"/>
-              <a:t>TED - Technology, Entertainment and Design. </a:t>
-            </a:r>
-          </a:p>
-          <a:p>
-            <a:r>
-              <a:rPr lang="en-US" dirty="0" smtClean="0"/>
-              <a:t>TED </a:t>
-            </a:r>
-            <a:r>
-              <a:rPr lang="en-US" dirty="0"/>
-              <a:t>talks are a collection of brief yet intriguing conversations on a wide variety of topics. These narrations are presented by “the world’s most inspired thinkers” as TED refers to them. The TED organization strives to motivate curiosity, conversation and discovery. </a:t>
-            </a:r>
-            <a:endParaRPr lang="en-US" dirty="0" smtClean="0"/>
-          </a:p>
-          <a:p>
-            <a:r>
               <a:rPr lang="en-US" dirty="0" smtClean="0"/>
               <a:t>TED² </a:t>
             </a:r>

</xml_diff>

<commit_message>
update to presentation slide
</commit_message>
<xml_diff>
--- a/Presentation/TED².pptx
+++ b/Presentation/TED².pptx
@@ -1531,7 +1531,7 @@
             <a:fld id="{48A87A34-81AB-432B-8DAE-1953F412C126}" type="datetimeFigureOut">
               <a:rPr lang="en-US" dirty="0"/>
               <a:pPr/>
-              <a:t>10/5/17</a:t>
+              <a:t>10/6/17</a:t>
             </a:fld>
             <a:endParaRPr lang="en-US" dirty="0"/>
           </a:p>
@@ -2985,7 +2985,7 @@
           <a:p>
             <a:fld id="{48A87A34-81AB-432B-8DAE-1953F412C126}" type="datetimeFigureOut">
               <a:rPr lang="en-US" dirty="0"/>
-              <a:t>10/5/17</a:t>
+              <a:t>10/6/17</a:t>
             </a:fld>
             <a:endParaRPr lang="en-US" dirty="0"/>
           </a:p>
@@ -4433,7 +4433,7 @@
           <a:p>
             <a:fld id="{48A87A34-81AB-432B-8DAE-1953F412C126}" type="datetimeFigureOut">
               <a:rPr lang="en-US" dirty="0"/>
-              <a:t>10/5/17</a:t>
+              <a:t>10/6/17</a:t>
             </a:fld>
             <a:endParaRPr lang="en-US" dirty="0"/>
           </a:p>
@@ -5883,7 +5883,7 @@
           <a:p>
             <a:fld id="{48A87A34-81AB-432B-8DAE-1953F412C126}" type="datetimeFigureOut">
               <a:rPr lang="en-US" dirty="0"/>
-              <a:t>10/5/17</a:t>
+              <a:t>10/6/17</a:t>
             </a:fld>
             <a:endParaRPr lang="en-US" dirty="0"/>
           </a:p>
@@ -7386,7 +7386,7 @@
           <a:p>
             <a:fld id="{48A87A34-81AB-432B-8DAE-1953F412C126}" type="datetimeFigureOut">
               <a:rPr lang="en-US" dirty="0"/>
-              <a:t>10/5/17</a:t>
+              <a:t>10/6/17</a:t>
             </a:fld>
             <a:endParaRPr lang="en-US" dirty="0"/>
           </a:p>
@@ -8902,7 +8902,7 @@
           <a:p>
             <a:fld id="{48A87A34-81AB-432B-8DAE-1953F412C126}" type="datetimeFigureOut">
               <a:rPr lang="en-US" dirty="0"/>
-              <a:t>10/5/17</a:t>
+              <a:t>10/6/17</a:t>
             </a:fld>
             <a:endParaRPr lang="en-US" dirty="0"/>
           </a:p>
@@ -10562,7 +10562,7 @@
           <a:p>
             <a:fld id="{48A87A34-81AB-432B-8DAE-1953F412C126}" type="datetimeFigureOut">
               <a:rPr lang="en-US" dirty="0"/>
-              <a:t>10/5/17</a:t>
+              <a:t>10/6/17</a:t>
             </a:fld>
             <a:endParaRPr lang="en-US" dirty="0"/>
           </a:p>
@@ -11955,7 +11955,7 @@
           <a:p>
             <a:fld id="{48A87A34-81AB-432B-8DAE-1953F412C126}" type="datetimeFigureOut">
               <a:rPr lang="en-US" dirty="0"/>
-              <a:t>10/5/17</a:t>
+              <a:t>10/6/17</a:t>
             </a:fld>
             <a:endParaRPr lang="en-US" dirty="0"/>
           </a:p>
@@ -12050,7 +12050,7 @@
           <a:p>
             <a:fld id="{48A87A34-81AB-432B-8DAE-1953F412C126}" type="datetimeFigureOut">
               <a:rPr lang="en-US" dirty="0"/>
-              <a:t>10/5/17</a:t>
+              <a:t>10/6/17</a:t>
             </a:fld>
             <a:endParaRPr lang="en-US" dirty="0"/>
           </a:p>
@@ -13571,7 +13571,7 @@
           <a:p>
             <a:fld id="{48A87A34-81AB-432B-8DAE-1953F412C126}" type="datetimeFigureOut">
               <a:rPr lang="en-US" dirty="0"/>
-              <a:t>10/5/17</a:t>
+              <a:t>10/6/17</a:t>
             </a:fld>
             <a:endParaRPr lang="en-US" dirty="0"/>
           </a:p>
@@ -15102,7 +15102,7 @@
           <a:p>
             <a:fld id="{48A87A34-81AB-432B-8DAE-1953F412C126}" type="datetimeFigureOut">
               <a:rPr lang="en-US" dirty="0"/>
-              <a:t>10/5/17</a:t>
+              <a:t>10/6/17</a:t>
             </a:fld>
             <a:endParaRPr lang="en-US" dirty="0"/>
           </a:p>
@@ -15348,7 +15348,7 @@
             <a:fld id="{48A87A34-81AB-432B-8DAE-1953F412C126}" type="datetimeFigureOut">
               <a:rPr lang="en-US" dirty="0"/>
               <a:pPr/>
-              <a:t>10/5/17</a:t>
+              <a:t>10/6/17</a:t>
             </a:fld>
             <a:endParaRPr lang="en-US" dirty="0"/>
           </a:p>
@@ -16181,20 +16181,12 @@
           </a:p>
           <a:p>
             <a:r>
-              <a:rPr lang="en-US" dirty="0"/>
-              <a:t>Marketing Plan </a:t>
+              <a:rPr lang="en-US" smtClean="0"/>
+              <a:t>Group </a:t>
             </a:r>
-          </a:p>
-          <a:p>
             <a:r>
               <a:rPr lang="en-US" dirty="0"/>
-              <a:t>Cost </a:t>
-            </a:r>
-          </a:p>
-          <a:p>
-            <a:r>
-              <a:rPr lang="en-US" dirty="0"/>
-              <a:t>Group Milestones </a:t>
+              <a:t>Milestones </a:t>
             </a:r>
           </a:p>
         </p:txBody>
@@ -16603,6 +16595,13 @@
             <a:r>
               <a:rPr lang="en-US" dirty="0" err="1" smtClean="0"/>
               <a:t>Draw.io</a:t>
+            </a:r>
+            <a:endParaRPr lang="en-US" dirty="0" smtClean="0"/>
+          </a:p>
+          <a:p>
+            <a:r>
+              <a:rPr lang="en-US" smtClean="0"/>
+              <a:t>Mocha</a:t>
             </a:r>
             <a:endParaRPr lang="en-US" dirty="0" smtClean="0"/>
           </a:p>

</xml_diff>